<commit_message>
para subir los avances hay que guardar y cerrar el archivoxd
</commit_message>
<xml_diff>
--- a/Prueewebaa.pptx
+++ b/Prueewebaa.pptx
@@ -104,6 +104,11 @@
       </a:defRPr>
     </a:lvl9pPr>
   </p:defaultTextStyle>
+  <p:extLst>
+    <p:ext uri="{EFAFB233-063F-42B5-8137-9DF3F51BA10A}">
+      <p15:sldGuideLst xmlns:p15="http://schemas.microsoft.com/office/powerpoint/2012/main"/>
+    </p:ext>
+  </p:extLst>
 </p:presentation>
 </file>
 
@@ -256,7 +261,7 @@
           <a:p>
             <a:fld id="{2FDDAC4C-501D-4307-809E-1E4589B9E2FE}" type="datetimeFigureOut">
               <a:rPr lang="es-SV" smtClean="0"/>
-              <a:t>26/3/2024</a:t>
+              <a:t>27/3/2024</a:t>
             </a:fld>
             <a:endParaRPr lang="es-SV"/>
           </a:p>
@@ -456,7 +461,7 @@
           <a:p>
             <a:fld id="{2FDDAC4C-501D-4307-809E-1E4589B9E2FE}" type="datetimeFigureOut">
               <a:rPr lang="es-SV" smtClean="0"/>
-              <a:t>26/3/2024</a:t>
+              <a:t>27/3/2024</a:t>
             </a:fld>
             <a:endParaRPr lang="es-SV"/>
           </a:p>
@@ -666,7 +671,7 @@
           <a:p>
             <a:fld id="{2FDDAC4C-501D-4307-809E-1E4589B9E2FE}" type="datetimeFigureOut">
               <a:rPr lang="es-SV" smtClean="0"/>
-              <a:t>26/3/2024</a:t>
+              <a:t>27/3/2024</a:t>
             </a:fld>
             <a:endParaRPr lang="es-SV"/>
           </a:p>
@@ -866,7 +871,7 @@
           <a:p>
             <a:fld id="{2FDDAC4C-501D-4307-809E-1E4589B9E2FE}" type="datetimeFigureOut">
               <a:rPr lang="es-SV" smtClean="0"/>
-              <a:t>26/3/2024</a:t>
+              <a:t>27/3/2024</a:t>
             </a:fld>
             <a:endParaRPr lang="es-SV"/>
           </a:p>
@@ -1142,7 +1147,7 @@
           <a:p>
             <a:fld id="{2FDDAC4C-501D-4307-809E-1E4589B9E2FE}" type="datetimeFigureOut">
               <a:rPr lang="es-SV" smtClean="0"/>
-              <a:t>26/3/2024</a:t>
+              <a:t>27/3/2024</a:t>
             </a:fld>
             <a:endParaRPr lang="es-SV"/>
           </a:p>
@@ -1410,7 +1415,7 @@
           <a:p>
             <a:fld id="{2FDDAC4C-501D-4307-809E-1E4589B9E2FE}" type="datetimeFigureOut">
               <a:rPr lang="es-SV" smtClean="0"/>
-              <a:t>26/3/2024</a:t>
+              <a:t>27/3/2024</a:t>
             </a:fld>
             <a:endParaRPr lang="es-SV"/>
           </a:p>
@@ -1825,7 +1830,7 @@
           <a:p>
             <a:fld id="{2FDDAC4C-501D-4307-809E-1E4589B9E2FE}" type="datetimeFigureOut">
               <a:rPr lang="es-SV" smtClean="0"/>
-              <a:t>26/3/2024</a:t>
+              <a:t>27/3/2024</a:t>
             </a:fld>
             <a:endParaRPr lang="es-SV"/>
           </a:p>
@@ -1967,7 +1972,7 @@
           <a:p>
             <a:fld id="{2FDDAC4C-501D-4307-809E-1E4589B9E2FE}" type="datetimeFigureOut">
               <a:rPr lang="es-SV" smtClean="0"/>
-              <a:t>26/3/2024</a:t>
+              <a:t>27/3/2024</a:t>
             </a:fld>
             <a:endParaRPr lang="es-SV"/>
           </a:p>
@@ -2080,7 +2085,7 @@
           <a:p>
             <a:fld id="{2FDDAC4C-501D-4307-809E-1E4589B9E2FE}" type="datetimeFigureOut">
               <a:rPr lang="es-SV" smtClean="0"/>
-              <a:t>26/3/2024</a:t>
+              <a:t>27/3/2024</a:t>
             </a:fld>
             <a:endParaRPr lang="es-SV"/>
           </a:p>
@@ -2393,7 +2398,7 @@
           <a:p>
             <a:fld id="{2FDDAC4C-501D-4307-809E-1E4589B9E2FE}" type="datetimeFigureOut">
               <a:rPr lang="es-SV" smtClean="0"/>
-              <a:t>26/3/2024</a:t>
+              <a:t>27/3/2024</a:t>
             </a:fld>
             <a:endParaRPr lang="es-SV"/>
           </a:p>
@@ -2682,7 +2687,7 @@
           <a:p>
             <a:fld id="{2FDDAC4C-501D-4307-809E-1E4589B9E2FE}" type="datetimeFigureOut">
               <a:rPr lang="es-SV" smtClean="0"/>
-              <a:t>26/3/2024</a:t>
+              <a:t>27/3/2024</a:t>
             </a:fld>
             <a:endParaRPr lang="es-SV"/>
           </a:p>
@@ -2925,7 +2930,7 @@
           <a:p>
             <a:fld id="{2FDDAC4C-501D-4307-809E-1E4589B9E2FE}" type="datetimeFigureOut">
               <a:rPr lang="es-SV" smtClean="0"/>
-              <a:t>26/3/2024</a:t>
+              <a:t>27/3/2024</a:t>
             </a:fld>
             <a:endParaRPr lang="es-SV"/>
           </a:p>
@@ -3395,7 +3400,22 @@
           <a:bodyPr/>
           <a:lstStyle/>
           <a:p>
-            <a:endParaRPr lang="es-SV"/>
+            <a:r>
+              <a:rPr lang="es-MX" dirty="0"/>
+              <a:t>Vamos a ver si se sube lo que cambio </a:t>
+            </a:r>
+            <a:r>
+              <a:rPr lang="es-MX" dirty="0" err="1"/>
+              <a:t>xd</a:t>
+            </a:r>
+            <a:endParaRPr lang="es-MX" dirty="0"/>
+          </a:p>
+          <a:p>
+            <a:r>
+              <a:rPr lang="es-MX" dirty="0" err="1"/>
+              <a:t>fsfafs</a:t>
+            </a:r>
+            <a:endParaRPr lang="es-SV" dirty="0"/>
           </a:p>
         </p:txBody>
       </p:sp>

</xml_diff>